<commit_message>
Diederich presentation slides updated
</commit_message>
<xml_diff>
--- a/MidtermPresentation/Diederich_MidtermPresentation.pptx
+++ b/MidtermPresentation/Diederich_MidtermPresentation.pptx
@@ -7,11 +7,13 @@
   <p:sldIdLst>
     <p:sldId id="256" r:id="rId2"/>
     <p:sldId id="260" r:id="rId3"/>
-    <p:sldId id="262" r:id="rId4"/>
-    <p:sldId id="265" r:id="rId5"/>
-    <p:sldId id="267" r:id="rId6"/>
-    <p:sldId id="263" r:id="rId7"/>
-    <p:sldId id="266" r:id="rId8"/>
+    <p:sldId id="269" r:id="rId4"/>
+    <p:sldId id="268" r:id="rId5"/>
+    <p:sldId id="262" r:id="rId6"/>
+    <p:sldId id="265" r:id="rId7"/>
+    <p:sldId id="267" r:id="rId8"/>
+    <p:sldId id="263" r:id="rId9"/>
+    <p:sldId id="266" r:id="rId10"/>
   </p:sldIdLst>
   <p:sldSz cx="12192000" cy="6858000"/>
   <p:notesSz cx="6858000" cy="9144000"/>
@@ -3659,7 +3661,7 @@
           <a:p>
             <a:r>
               <a:rPr lang="en-US" dirty="0"/>
-              <a:t>Kyle – technical challenges &amp; what has been accomplished</a:t>
+              <a:t>Kyle – technical challenges &amp; what has been accomplished (2 slides follow-finished)</a:t>
             </a:r>
           </a:p>
         </p:txBody>
@@ -3711,86 +3713,106 @@
           <a:p>
             <a:r>
               <a:rPr lang="en-US" dirty="0"/>
-              <a:t>Related Work</a:t>
-            </a:r>
-          </a:p>
-        </p:txBody>
-      </p:sp>
-      <p:sp>
-        <p:nvSpPr>
-          <p:cNvPr id="3" name="Content Placeholder 2"/>
-          <p:cNvSpPr>
-            <a:spLocks noGrp="1"/>
-          </p:cNvSpPr>
+              <a:t>The Query Snapshot Cycle</a:t>
+            </a:r>
+          </a:p>
+        </p:txBody>
+      </p:sp>
+      <p:pic>
+        <p:nvPicPr>
+          <p:cNvPr id="4" name="Content Placeholder 3"/>
+          <p:cNvPicPr>
+            <a:picLocks noGrp="1" noChangeAspect="1"/>
+          </p:cNvPicPr>
           <p:nvPr>
             <p:ph idx="1"/>
           </p:nvPr>
-        </p:nvSpPr>
-        <p:spPr/>
-        <p:txBody>
-          <a:bodyPr/>
-          <a:lstStyle/>
-          <a:p>
-            <a:r>
-              <a:rPr lang="en-US" dirty="0"/>
-              <a:t>Describe how your system builds on prior work</a:t>
-            </a:r>
-          </a:p>
-          <a:p>
-            <a:pPr lvl="1"/>
-            <a:r>
-              <a:rPr lang="en-US" dirty="0"/>
-              <a:t>what other systems are related to your work</a:t>
-            </a:r>
-          </a:p>
-          <a:p>
-            <a:pPr lvl="1"/>
-            <a:r>
-              <a:rPr lang="en-US" dirty="0"/>
-              <a:t>how did others overcome the challenges that you face</a:t>
-            </a:r>
-          </a:p>
-          <a:p>
-            <a:pPr lvl="1"/>
-            <a:r>
-              <a:rPr lang="en-US" dirty="0"/>
-              <a:t>do their solutions apply to your case</a:t>
-            </a:r>
-          </a:p>
-          <a:p>
-            <a:pPr lvl="2"/>
-            <a:r>
-              <a:rPr lang="en-US" dirty="0"/>
-              <a:t>if not, what novel ideals did you have to incorporate to make your system work</a:t>
-            </a:r>
-          </a:p>
-          <a:p>
-            <a:pPr lvl="1"/>
-            <a:r>
-              <a:rPr lang="en-US" dirty="0"/>
-              <a:t>make sure to include at least two references</a:t>
-            </a:r>
-          </a:p>
-          <a:p>
-            <a:endParaRPr lang="en-US" dirty="0"/>
-          </a:p>
-          <a:p>
-            <a:endParaRPr lang="en-US" dirty="0"/>
-          </a:p>
-          <a:p>
+        </p:nvPicPr>
+        <p:blipFill>
+          <a:blip r:embed="rId2">
+            <a:extLst>
+              <a:ext uri="{28A0092B-C50C-407E-A947-70E740481C1C}">
+                <a14:useLocalDpi xmlns:a14="http://schemas.microsoft.com/office/drawing/2010/main" val="0"/>
+              </a:ext>
+            </a:extLst>
+          </a:blip>
+          <a:stretch>
+            <a:fillRect/>
+          </a:stretch>
+        </p:blipFill>
+        <p:spPr>
+          <a:xfrm>
+            <a:off x="4386537" y="699655"/>
+            <a:ext cx="6314526" cy="5458690"/>
+          </a:xfrm>
+        </p:spPr>
+      </p:pic>
+      <p:sp>
+        <p:nvSpPr>
+          <p:cNvPr id="5" name="Text Placeholder 4"/>
+          <p:cNvSpPr>
+            <a:spLocks noGrp="1"/>
+          </p:cNvSpPr>
+          <p:nvPr>
+            <p:ph type="body" sz="half" idx="2"/>
+          </p:nvPr>
+        </p:nvSpPr>
+        <p:spPr/>
+        <p:txBody>
+          <a:bodyPr/>
+          <a:lstStyle/>
+          <a:p>
+            <a:pPr marL="285750" indent="-285750">
+              <a:buFont typeface="Arial" panose="020B0604020202020204" pitchFamily="34" charset="0"/>
+              <a:buChar char="•"/>
+            </a:pPr>
+            <a:r>
+              <a:rPr lang="en-US" dirty="0"/>
+              <a:t>First attempt to determine how to create interactors within application</a:t>
+            </a:r>
+          </a:p>
+          <a:p>
+            <a:pPr marL="285750" indent="-285750">
+              <a:buFont typeface="Arial" panose="020B0604020202020204" pitchFamily="34" charset="0"/>
+              <a:buChar char="•"/>
+            </a:pPr>
+            <a:r>
+              <a:rPr lang="en-US" dirty="0"/>
+              <a:t>Requires both keyboard and gaze in conjunction</a:t>
+            </a:r>
+          </a:p>
+          <a:p>
+            <a:pPr marL="285750" indent="-285750">
+              <a:buFont typeface="Arial" panose="020B0604020202020204" pitchFamily="34" charset="0"/>
+              <a:buChar char="•"/>
+            </a:pPr>
+            <a:r>
+              <a:rPr lang="en-US" dirty="0"/>
+              <a:t>Process:</a:t>
+            </a:r>
+          </a:p>
+          <a:p>
+            <a:pPr marL="742950" lvl="1" indent="-285750">
+              <a:buFont typeface="Arial" panose="020B0604020202020204" pitchFamily="34" charset="0"/>
+              <a:buChar char="•"/>
+            </a:pPr>
+            <a:r>
+              <a:rPr lang="en-US" dirty="0"/>
+              <a:t>Press key to activate snapshot</a:t>
+            </a:r>
+          </a:p>
+          <a:p>
+            <a:pPr marL="742950" lvl="1" indent="-285750">
+              <a:buFont typeface="Arial" panose="020B0604020202020204" pitchFamily="34" charset="0"/>
+              <a:buChar char="•"/>
+            </a:pPr>
             <a:r>
               <a:rPr lang="en-US" dirty="0" err="1"/>
-              <a:t>Suhas</a:t>
-            </a:r>
-            <a:r>
-              <a:rPr lang="en-US" dirty="0"/>
-              <a:t> – technical details</a:t>
-            </a:r>
-          </a:p>
-          <a:p>
-            <a:r>
-              <a:rPr lang="en-US" dirty="0"/>
-              <a:t>Kyle – research in the area (references) </a:t>
+              <a:t>EyeX</a:t>
+            </a:r>
+            <a:r>
+              <a:rPr lang="en-US" dirty="0"/>
+              <a:t> Engine queries screen to determine what item occurs at coordinates of user gaze</a:t>
             </a:r>
           </a:p>
         </p:txBody>
@@ -3798,7 +3820,7 @@
     </p:spTree>
     <p:extLst>
       <p:ext uri="{BB962C8B-B14F-4D97-AF65-F5344CB8AC3E}">
-        <p14:creationId xmlns:p14="http://schemas.microsoft.com/office/powerpoint/2010/main" val="471565324"/>
+        <p14:creationId xmlns:p14="http://schemas.microsoft.com/office/powerpoint/2010/main" val="90406731"/>
       </p:ext>
     </p:extLst>
   </p:cSld>
@@ -3842,6 +3864,289 @@
           <a:p>
             <a:r>
               <a:rPr lang="en-US" dirty="0"/>
+              <a:t>Gaze-Aware Behavior</a:t>
+            </a:r>
+          </a:p>
+        </p:txBody>
+      </p:sp>
+      <p:sp>
+        <p:nvSpPr>
+          <p:cNvPr id="3" name="Content Placeholder 2"/>
+          <p:cNvSpPr>
+            <a:spLocks noGrp="1"/>
+          </p:cNvSpPr>
+          <p:nvPr>
+            <p:ph idx="1"/>
+          </p:nvPr>
+        </p:nvSpPr>
+        <p:spPr/>
+        <p:txBody>
+          <a:bodyPr>
+            <a:normAutofit/>
+          </a:bodyPr>
+          <a:lstStyle/>
+          <a:p>
+            <a:r>
+              <a:rPr lang="en-US" dirty="0"/>
+              <a:t>Create a set of items that are </a:t>
+            </a:r>
+            <a:r>
+              <a:rPr lang="en-US" dirty="0" err="1"/>
+              <a:t>interactable</a:t>
+            </a:r>
+            <a:r>
+              <a:rPr lang="en-US" dirty="0"/>
+              <a:t> subject to user’s eye-gaze</a:t>
+            </a:r>
+          </a:p>
+          <a:p>
+            <a:r>
+              <a:rPr lang="en-US" dirty="0"/>
+              <a:t>Launch event when user’s gaze enters boundaries of interactor</a:t>
+            </a:r>
+          </a:p>
+          <a:p>
+            <a:r>
+              <a:rPr lang="en-US" dirty="0"/>
+              <a:t>Apply delay time</a:t>
+            </a:r>
+          </a:p>
+          <a:p>
+            <a:pPr lvl="1"/>
+            <a:r>
+              <a:rPr lang="en-US" dirty="0"/>
+              <a:t>Add inertia to account to rapid, random eye movements</a:t>
+            </a:r>
+          </a:p>
+          <a:p>
+            <a:pPr lvl="1"/>
+            <a:r>
+              <a:rPr lang="en-US" dirty="0"/>
+              <a:t>Gaze point must start on interactor until response is triggered</a:t>
+            </a:r>
+          </a:p>
+          <a:p>
+            <a:pPr lvl="1"/>
+            <a:r>
+              <a:rPr lang="en-US" dirty="0"/>
+              <a:t>Manually adjustable delay parameter</a:t>
+            </a:r>
+          </a:p>
+          <a:p>
+            <a:r>
+              <a:rPr lang="en-US" dirty="0"/>
+              <a:t>Provide focus points:</a:t>
+            </a:r>
+          </a:p>
+          <a:p>
+            <a:pPr lvl="1"/>
+            <a:r>
+              <a:rPr lang="en-US" dirty="0"/>
+              <a:t>Visual hotspot: captions, buttons, etc.</a:t>
+            </a:r>
+          </a:p>
+          <a:p>
+            <a:pPr lvl="1"/>
+            <a:r>
+              <a:rPr lang="en-US" dirty="0"/>
+              <a:t>Sufficiently separation. Spacing around/between visual elements and/or increased size.  (</a:t>
+            </a:r>
+            <a:r>
+              <a:rPr lang="en-US" dirty="0" err="1"/>
+              <a:t>Tobii</a:t>
+            </a:r>
+            <a:r>
+              <a:rPr lang="en-US" dirty="0"/>
+              <a:t> developers note: spacing effective than size.)</a:t>
+            </a:r>
+          </a:p>
+          <a:p>
+            <a:pPr lvl="1"/>
+            <a:r>
+              <a:rPr lang="en-US" dirty="0"/>
+              <a:t>Care in visual feedback given.  Example, highlight only text or visual hotspot of button.</a:t>
+            </a:r>
+          </a:p>
+        </p:txBody>
+      </p:sp>
+    </p:spTree>
+    <p:extLst>
+      <p:ext uri="{BB962C8B-B14F-4D97-AF65-F5344CB8AC3E}">
+        <p14:creationId xmlns:p14="http://schemas.microsoft.com/office/powerpoint/2010/main" val="1276905552"/>
+      </p:ext>
+    </p:extLst>
+  </p:cSld>
+  <p:clrMapOvr>
+    <a:masterClrMapping/>
+  </p:clrMapOvr>
+</p:sld>
+</file>
+
+<file path=ppt/slides/slide5.xml><?xml version="1.0" encoding="utf-8"?>
+<p:sld xmlns:a="http://schemas.openxmlformats.org/drawingml/2006/main" xmlns:r="http://schemas.openxmlformats.org/officeDocument/2006/relationships" xmlns:p="http://schemas.openxmlformats.org/presentationml/2006/main">
+  <p:cSld>
+    <p:spTree>
+      <p:nvGrpSpPr>
+        <p:cNvPr id="1" name=""/>
+        <p:cNvGrpSpPr/>
+        <p:nvPr/>
+      </p:nvGrpSpPr>
+      <p:grpSpPr>
+        <a:xfrm>
+          <a:off x="0" y="0"/>
+          <a:ext cx="0" cy="0"/>
+          <a:chOff x="0" y="0"/>
+          <a:chExt cx="0" cy="0"/>
+        </a:xfrm>
+      </p:grpSpPr>
+      <p:sp>
+        <p:nvSpPr>
+          <p:cNvPr id="2" name="Title 1"/>
+          <p:cNvSpPr>
+            <a:spLocks noGrp="1"/>
+          </p:cNvSpPr>
+          <p:nvPr>
+            <p:ph type="title"/>
+          </p:nvPr>
+        </p:nvSpPr>
+        <p:spPr/>
+        <p:txBody>
+          <a:bodyPr/>
+          <a:lstStyle/>
+          <a:p>
+            <a:r>
+              <a:rPr lang="en-US" dirty="0"/>
+              <a:t>Related Work</a:t>
+            </a:r>
+          </a:p>
+        </p:txBody>
+      </p:sp>
+      <p:sp>
+        <p:nvSpPr>
+          <p:cNvPr id="3" name="Content Placeholder 2"/>
+          <p:cNvSpPr>
+            <a:spLocks noGrp="1"/>
+          </p:cNvSpPr>
+          <p:nvPr>
+            <p:ph idx="1"/>
+          </p:nvPr>
+        </p:nvSpPr>
+        <p:spPr/>
+        <p:txBody>
+          <a:bodyPr/>
+          <a:lstStyle/>
+          <a:p>
+            <a:r>
+              <a:rPr lang="en-US" dirty="0"/>
+              <a:t>Describe how your system builds on prior work</a:t>
+            </a:r>
+          </a:p>
+          <a:p>
+            <a:pPr lvl="1"/>
+            <a:r>
+              <a:rPr lang="en-US" dirty="0"/>
+              <a:t>what other systems are related to your work</a:t>
+            </a:r>
+          </a:p>
+          <a:p>
+            <a:pPr lvl="1"/>
+            <a:r>
+              <a:rPr lang="en-US" dirty="0"/>
+              <a:t>how did others overcome the challenges that you face</a:t>
+            </a:r>
+          </a:p>
+          <a:p>
+            <a:pPr lvl="1"/>
+            <a:r>
+              <a:rPr lang="en-US" dirty="0"/>
+              <a:t>do their solutions apply to your case</a:t>
+            </a:r>
+          </a:p>
+          <a:p>
+            <a:pPr lvl="2"/>
+            <a:r>
+              <a:rPr lang="en-US" dirty="0"/>
+              <a:t>if not, what novel ideals did you have to incorporate to make your system work</a:t>
+            </a:r>
+          </a:p>
+          <a:p>
+            <a:pPr lvl="1"/>
+            <a:r>
+              <a:rPr lang="en-US" dirty="0"/>
+              <a:t>make sure to include at least two references</a:t>
+            </a:r>
+          </a:p>
+          <a:p>
+            <a:endParaRPr lang="en-US" dirty="0"/>
+          </a:p>
+          <a:p>
+            <a:endParaRPr lang="en-US" dirty="0"/>
+          </a:p>
+          <a:p>
+            <a:r>
+              <a:rPr lang="en-US" dirty="0" err="1"/>
+              <a:t>Suhas</a:t>
+            </a:r>
+            <a:r>
+              <a:rPr lang="en-US" dirty="0"/>
+              <a:t> – technical details</a:t>
+            </a:r>
+          </a:p>
+          <a:p>
+            <a:r>
+              <a:rPr lang="en-US" dirty="0"/>
+              <a:t>Kyle – research in the area (references)  - (2 slides follow [finished])</a:t>
+            </a:r>
+          </a:p>
+        </p:txBody>
+      </p:sp>
+    </p:spTree>
+    <p:extLst>
+      <p:ext uri="{BB962C8B-B14F-4D97-AF65-F5344CB8AC3E}">
+        <p14:creationId xmlns:p14="http://schemas.microsoft.com/office/powerpoint/2010/main" val="471565324"/>
+      </p:ext>
+    </p:extLst>
+  </p:cSld>
+  <p:clrMapOvr>
+    <a:masterClrMapping/>
+  </p:clrMapOvr>
+</p:sld>
+</file>
+
+<file path=ppt/slides/slide6.xml><?xml version="1.0" encoding="utf-8"?>
+<p:sld xmlns:a="http://schemas.openxmlformats.org/drawingml/2006/main" xmlns:r="http://schemas.openxmlformats.org/officeDocument/2006/relationships" xmlns:p="http://schemas.openxmlformats.org/presentationml/2006/main">
+  <p:cSld>
+    <p:spTree>
+      <p:nvGrpSpPr>
+        <p:cNvPr id="1" name=""/>
+        <p:cNvGrpSpPr/>
+        <p:nvPr/>
+      </p:nvGrpSpPr>
+      <p:grpSpPr>
+        <a:xfrm>
+          <a:off x="0" y="0"/>
+          <a:ext cx="0" cy="0"/>
+          <a:chOff x="0" y="0"/>
+          <a:chExt cx="0" cy="0"/>
+        </a:xfrm>
+      </p:grpSpPr>
+      <p:sp>
+        <p:nvSpPr>
+          <p:cNvPr id="2" name="Title 1"/>
+          <p:cNvSpPr>
+            <a:spLocks noGrp="1"/>
+          </p:cNvSpPr>
+          <p:nvPr>
+            <p:ph type="title"/>
+          </p:nvPr>
+        </p:nvSpPr>
+        <p:spPr/>
+        <p:txBody>
+          <a:bodyPr/>
+          <a:lstStyle/>
+          <a:p>
+            <a:r>
+              <a:rPr lang="en-US" dirty="0"/>
               <a:t>Gaze vs. Mouse</a:t>
             </a:r>
           </a:p>
@@ -3992,7 +4297,7 @@
 </p:sld>
 </file>
 
-<file path=ppt/slides/slide5.xml><?xml version="1.0" encoding="utf-8"?>
+<file path=ppt/slides/slide7.xml><?xml version="1.0" encoding="utf-8"?>
 <p:sld xmlns:a="http://schemas.openxmlformats.org/drawingml/2006/main" xmlns:r="http://schemas.openxmlformats.org/officeDocument/2006/relationships" xmlns:p="http://schemas.openxmlformats.org/presentationml/2006/main">
   <p:cSld>
     <p:spTree>
@@ -4219,7 +4524,7 @@
 </p:sld>
 </file>
 
-<file path=ppt/slides/slide6.xml><?xml version="1.0" encoding="utf-8"?>
+<file path=ppt/slides/slide8.xml><?xml version="1.0" encoding="utf-8"?>
 <p:sld xmlns:a="http://schemas.openxmlformats.org/drawingml/2006/main" xmlns:r="http://schemas.openxmlformats.org/officeDocument/2006/relationships" xmlns:p="http://schemas.openxmlformats.org/presentationml/2006/main">
   <p:cSld>
     <p:spTree>
@@ -4270,7 +4575,9 @@
         </p:nvSpPr>
         <p:spPr/>
         <p:txBody>
-          <a:bodyPr/>
+          <a:bodyPr>
+            <a:normAutofit lnSpcReduction="10000"/>
+          </a:bodyPr>
           <a:lstStyle/>
           <a:p>
             <a:r>
@@ -4322,17 +4629,20 @@
               <a:rPr lang="en-US" dirty="0" err="1"/>
               <a:t>Suhas</a:t>
             </a:r>
-            <a:endParaRPr lang="en-US" dirty="0"/>
+            <a:r>
+              <a:rPr lang="en-US" dirty="0"/>
+              <a:t> (included ideas of what to measure in earlier slides – [finished])</a:t>
+            </a:r>
           </a:p>
           <a:p>
             <a:pPr lvl="1"/>
             <a:r>
               <a:rPr lang="en-US" dirty="0"/>
-              <a:t>Delay experimentation between gaze </a:t>
-            </a:r>
-            <a:r>
-              <a:rPr lang="en-US"/>
-              <a:t>and dwell</a:t>
+              <a:t>Delay experimentation between gaze and dwell (</a:t>
+            </a:r>
+            <a:r>
+              <a:rPr lang="en-US"/>
+              <a:t>Missing experimental design)</a:t>
             </a:r>
             <a:endParaRPr lang="en-US" dirty="0"/>
           </a:p>
@@ -4351,7 +4661,7 @@
 </p:sld>
 </file>
 
-<file path=ppt/slides/slide7.xml><?xml version="1.0" encoding="utf-8"?>
+<file path=ppt/slides/slide9.xml><?xml version="1.0" encoding="utf-8"?>
 <p:sld xmlns:a="http://schemas.openxmlformats.org/drawingml/2006/main" xmlns:r="http://schemas.openxmlformats.org/officeDocument/2006/relationships" xmlns:p="http://schemas.openxmlformats.org/presentationml/2006/main">
   <p:cSld>
     <p:spTree>

</xml_diff>